<commit_message>
Informe y Presentacion Final
</commit_message>
<xml_diff>
--- a/Lab1/Presentacion_lab1.pptx
+++ b/Lab1/Presentacion_lab1.pptx
@@ -6,10 +6,11 @@
   </p:sldMasterIdLst>
   <p:sldIdLst>
     <p:sldId id="256" r:id="rId2"/>
-    <p:sldId id="257" r:id="rId3"/>
-    <p:sldId id="258" r:id="rId4"/>
-    <p:sldId id="259" r:id="rId5"/>
-    <p:sldId id="260" r:id="rId6"/>
+    <p:sldId id="261" r:id="rId3"/>
+    <p:sldId id="257" r:id="rId4"/>
+    <p:sldId id="258" r:id="rId5"/>
+    <p:sldId id="259" r:id="rId6"/>
+    <p:sldId id="260" r:id="rId7"/>
   </p:sldIdLst>
   <p:sldSz cx="9144000" cy="6858000" type="screen4x3"/>
   <p:notesSz cx="6858000" cy="9144000"/>
@@ -537,7 +538,7 @@
           <a:p>
             <a:fld id="{7BF2DE4F-C95C-48D3-BC02-A517A55A2857}" type="slidenum">
               <a:rPr lang="es-ES" smtClean="0"/>
-              <a:t>‹Nº›</a:t>
+              <a:t>‹#›</a:t>
             </a:fld>
             <a:endParaRPr lang="es-ES"/>
           </a:p>
@@ -702,7 +703,7 @@
           <a:p>
             <a:fld id="{7BF2DE4F-C95C-48D3-BC02-A517A55A2857}" type="slidenum">
               <a:rPr lang="es-ES" smtClean="0"/>
-              <a:t>‹Nº›</a:t>
+              <a:t>‹#›</a:t>
             </a:fld>
             <a:endParaRPr lang="es-ES"/>
           </a:p>
@@ -877,7 +878,7 @@
           <a:p>
             <a:fld id="{7BF2DE4F-C95C-48D3-BC02-A517A55A2857}" type="slidenum">
               <a:rPr lang="es-ES" smtClean="0"/>
-              <a:t>‹Nº›</a:t>
+              <a:t>‹#›</a:t>
             </a:fld>
             <a:endParaRPr lang="es-ES"/>
           </a:p>
@@ -1046,7 +1047,7 @@
           <a:p>
             <a:fld id="{7BF2DE4F-C95C-48D3-BC02-A517A55A2857}" type="slidenum">
               <a:rPr lang="es-ES" smtClean="0"/>
-              <a:t>‹Nº›</a:t>
+              <a:t>‹#›</a:t>
             </a:fld>
             <a:endParaRPr lang="es-ES"/>
           </a:p>
@@ -1501,7 +1502,7 @@
           <a:p>
             <a:fld id="{7BF2DE4F-C95C-48D3-BC02-A517A55A2857}" type="slidenum">
               <a:rPr lang="es-ES" smtClean="0"/>
-              <a:t>‹Nº›</a:t>
+              <a:t>‹#›</a:t>
             </a:fld>
             <a:endParaRPr lang="es-ES"/>
           </a:p>
@@ -1765,7 +1766,7 @@
           <a:p>
             <a:fld id="{7BF2DE4F-C95C-48D3-BC02-A517A55A2857}" type="slidenum">
               <a:rPr lang="es-ES" smtClean="0"/>
-              <a:t>‹Nº›</a:t>
+              <a:t>‹#›</a:t>
             </a:fld>
             <a:endParaRPr lang="es-ES"/>
           </a:p>
@@ -2139,7 +2140,7 @@
           <a:p>
             <a:fld id="{7BF2DE4F-C95C-48D3-BC02-A517A55A2857}" type="slidenum">
               <a:rPr lang="es-ES" smtClean="0"/>
-              <a:t>‹Nº›</a:t>
+              <a:t>‹#›</a:t>
             </a:fld>
             <a:endParaRPr lang="es-ES"/>
           </a:p>
@@ -2242,7 +2243,7 @@
           <a:p>
             <a:fld id="{7BF2DE4F-C95C-48D3-BC02-A517A55A2857}" type="slidenum">
               <a:rPr lang="es-ES" smtClean="0"/>
-              <a:t>‹Nº›</a:t>
+              <a:t>‹#›</a:t>
             </a:fld>
             <a:endParaRPr lang="es-ES"/>
           </a:p>
@@ -2351,7 +2352,7 @@
           <a:p>
             <a:fld id="{7BF2DE4F-C95C-48D3-BC02-A517A55A2857}" type="slidenum">
               <a:rPr lang="es-ES" smtClean="0"/>
-              <a:t>‹Nº›</a:t>
+              <a:t>‹#›</a:t>
             </a:fld>
             <a:endParaRPr lang="es-ES"/>
           </a:p>
@@ -2605,7 +2606,7 @@
           <a:p>
             <a:fld id="{7BF2DE4F-C95C-48D3-BC02-A517A55A2857}" type="slidenum">
               <a:rPr lang="es-ES" smtClean="0"/>
-              <a:t>‹Nº›</a:t>
+              <a:t>‹#›</a:t>
             </a:fld>
             <a:endParaRPr lang="es-ES"/>
           </a:p>
@@ -2859,7 +2860,7 @@
           <a:p>
             <a:fld id="{7BF2DE4F-C95C-48D3-BC02-A517A55A2857}" type="slidenum">
               <a:rPr lang="es-ES" smtClean="0"/>
-              <a:t>‹Nº›</a:t>
+              <a:t>‹#›</a:t>
             </a:fld>
             <a:endParaRPr lang="es-ES"/>
           </a:p>
@@ -3299,7 +3300,7 @@
           <a:p>
             <a:fld id="{7BF2DE4F-C95C-48D3-BC02-A517A55A2857}" type="slidenum">
               <a:rPr lang="es-ES" smtClean="0"/>
-              <a:t>‹Nº›</a:t>
+              <a:t>‹#›</a:t>
             </a:fld>
             <a:endParaRPr lang="es-ES"/>
           </a:p>
@@ -3883,6 +3884,101 @@
       </p:grpSpPr>
       <p:pic>
         <p:nvPicPr>
+          <p:cNvPr id="1026" name="Picture 2"/>
+          <p:cNvPicPr>
+            <a:picLocks noChangeAspect="1" noChangeArrowheads="1"/>
+          </p:cNvPicPr>
+          <p:nvPr/>
+        </p:nvPicPr>
+        <p:blipFill>
+          <a:blip r:embed="rId2">
+            <a:extLst>
+              <a:ext uri="{28A0092B-C50C-407E-A947-70E740481C1C}">
+                <a14:useLocalDpi xmlns:a14="http://schemas.microsoft.com/office/drawing/2010/main" val="0"/>
+              </a:ext>
+            </a:extLst>
+          </a:blip>
+          <a:srcRect/>
+          <a:stretch>
+            <a:fillRect/>
+          </a:stretch>
+        </p:blipFill>
+        <p:spPr bwMode="auto">
+          <a:xfrm>
+            <a:off x="395536" y="404664"/>
+            <a:ext cx="8275340" cy="5797755"/>
+          </a:xfrm>
+          <a:prstGeom prst="rect">
+            <a:avLst/>
+          </a:prstGeom>
+          <a:ln>
+            <a:noFill/>
+          </a:ln>
+          <a:effectLst>
+            <a:softEdge rad="112500"/>
+          </a:effectLst>
+          <a:extLst>
+            <a:ext uri="{909E8E84-426E-40DD-AFC4-6F175D3DCCD1}">
+              <a14:hiddenFill xmlns:a14="http://schemas.microsoft.com/office/drawing/2010/main">
+                <a:solidFill>
+                  <a:schemeClr val="accent1"/>
+                </a:solidFill>
+              </a14:hiddenFill>
+            </a:ext>
+            <a:ext uri="{91240B29-F687-4F45-9708-019B960494DF}">
+              <a14:hiddenLine xmlns:a14="http://schemas.microsoft.com/office/drawing/2010/main" w="9525">
+                <a:solidFill>
+                  <a:schemeClr val="tx1"/>
+                </a:solidFill>
+                <a:miter lim="800000"/>
+                <a:headEnd/>
+                <a:tailEnd/>
+              </a14:hiddenLine>
+            </a:ext>
+            <a:ext uri="{AF507438-7753-43E0-B8FC-AC1667EBCBE1}">
+              <a14:hiddenEffects xmlns:a14="http://schemas.microsoft.com/office/drawing/2010/main">
+                <a:effectLst>
+                  <a:outerShdw dist="35921" dir="2700000" algn="ctr" rotWithShape="0">
+                    <a:schemeClr val="bg2"/>
+                  </a:outerShdw>
+                </a:effectLst>
+              </a14:hiddenEffects>
+            </a:ext>
+          </a:extLst>
+        </p:spPr>
+      </p:pic>
+    </p:spTree>
+    <p:extLst>
+      <p:ext uri="{BB962C8B-B14F-4D97-AF65-F5344CB8AC3E}">
+        <p14:creationId xmlns:p14="http://schemas.microsoft.com/office/powerpoint/2010/main" val="3197944423"/>
+      </p:ext>
+    </p:extLst>
+  </p:cSld>
+  <p:clrMapOvr>
+    <a:masterClrMapping/>
+  </p:clrMapOvr>
+</p:sld>
+</file>
+
+<file path=ppt/slides/slide3.xml><?xml version="1.0" encoding="utf-8"?>
+<p:sld xmlns:a="http://schemas.openxmlformats.org/drawingml/2006/main" xmlns:r="http://schemas.openxmlformats.org/officeDocument/2006/relationships" xmlns:p="http://schemas.openxmlformats.org/presentationml/2006/main">
+  <p:cSld>
+    <p:spTree>
+      <p:nvGrpSpPr>
+        <p:cNvPr id="1" name=""/>
+        <p:cNvGrpSpPr/>
+        <p:nvPr/>
+      </p:nvGrpSpPr>
+      <p:grpSpPr>
+        <a:xfrm>
+          <a:off x="0" y="0"/>
+          <a:ext cx="0" cy="0"/>
+          <a:chOff x="0" y="0"/>
+          <a:chExt cx="0" cy="0"/>
+        </a:xfrm>
+      </p:grpSpPr>
+      <p:pic>
+        <p:nvPicPr>
           <p:cNvPr id="1026" name="Picture 2" descr="C:\Users\Gristelia\Downloads\code2flow_4cfbd.png"/>
           <p:cNvPicPr>
             <a:picLocks noChangeAspect="1" noChangeArrowheads="1"/>
@@ -3915,7 +4011,7 @@
 </p:sld>
 </file>
 
-<file path=ppt/slides/slide3.xml><?xml version="1.0" encoding="utf-8"?>
+<file path=ppt/slides/slide4.xml><?xml version="1.0" encoding="utf-8"?>
 <p:sld xmlns:a="http://schemas.openxmlformats.org/drawingml/2006/main" xmlns:r="http://schemas.openxmlformats.org/officeDocument/2006/relationships" xmlns:p="http://schemas.openxmlformats.org/presentationml/2006/main">
   <p:cSld>
     <p:spTree>
@@ -3966,7 +4062,7 @@
 </p:sld>
 </file>
 
-<file path=ppt/slides/slide4.xml><?xml version="1.0" encoding="utf-8"?>
+<file path=ppt/slides/slide5.xml><?xml version="1.0" encoding="utf-8"?>
 <p:sld xmlns:a="http://schemas.openxmlformats.org/drawingml/2006/main" xmlns:r="http://schemas.openxmlformats.org/officeDocument/2006/relationships" xmlns:p="http://schemas.openxmlformats.org/presentationml/2006/main">
   <p:cSld>
     <p:spTree>
@@ -4017,7 +4113,7 @@
 </p:sld>
 </file>
 
-<file path=ppt/slides/slide5.xml><?xml version="1.0" encoding="utf-8"?>
+<file path=ppt/slides/slide6.xml><?xml version="1.0" encoding="utf-8"?>
 <p:sld xmlns:a="http://schemas.openxmlformats.org/drawingml/2006/main" xmlns:r="http://schemas.openxmlformats.org/officeDocument/2006/relationships" xmlns:p="http://schemas.openxmlformats.org/presentationml/2006/main">
   <p:cSld>
     <p:spTree>
@@ -4073,7 +4169,7 @@
   <a:themeElements>
     <a:clrScheme name="Técnico">
       <a:dk1>
-        <a:sysClr val="windowText" lastClr="000000"/>
+        <a:sysClr val="windowText" lastClr="565656"/>
       </a:dk1>
       <a:lt1>
         <a:sysClr val="window" lastClr="FFFFFF"/>

</xml_diff>